<commit_message>
add more tips into c# presentatio
</commit_message>
<xml_diff>
--- a/clean-code-c#.pptx
+++ b/clean-code-c#.pptx
@@ -7295,7 +7295,7 @@
             <a:fld id="{CE3BC3F9-9C5B-4717-9F59-36DC790402FE}" type="datetimeFigureOut">
               <a:rPr lang="ru-RU" smtClean="0"/>
               <a:pPr/>
-              <a:t>25.06.2018</a:t>
+              <a:t>28.06.2018</a:t>
             </a:fld>
             <a:endParaRPr lang="ru-RU"/>
           </a:p>
@@ -7462,7 +7462,7 @@
             <a:fld id="{BBBAA9EB-8042-420D-843C-EBFC35DD9FFD}" type="datetimeFigureOut">
               <a:rPr lang="ru-RU" smtClean="0"/>
               <a:pPr/>
-              <a:t>25.06.2018</a:t>
+              <a:t>28.06.2018</a:t>
             </a:fld>
             <a:endParaRPr lang="ru-RU"/>
           </a:p>
@@ -8139,23 +8139,7 @@
                   <a:schemeClr val="accent1"/>
                 </a:solidFill>
               </a:rPr>
-              <a:t> из путей создания чистого кода – работа в </a:t>
-            </a:r>
-            <a:r>
-              <a:rPr lang="ru-RU" baseline="0" dirty="0" smtClean="0">
-                <a:solidFill>
-                  <a:schemeClr val="accent1"/>
-                </a:solidFill>
-              </a:rPr>
-              <a:t>рамках </a:t>
-            </a:r>
-            <a:r>
-              <a:rPr lang="ru-RU" baseline="0" dirty="0" smtClean="0">
-                <a:solidFill>
-                  <a:schemeClr val="accent1"/>
-                </a:solidFill>
-              </a:rPr>
-              <a:t>модульного дизайна.</a:t>
+              <a:t> из путей создания чистого кода – работа в рамках модульного дизайна.</a:t>
             </a:r>
           </a:p>
           <a:p>
@@ -9590,15 +9574,7 @@
             </a:br>
             <a:r>
               <a:rPr lang="ru-RU" baseline="0" dirty="0" smtClean="0"/>
-              <a:t>1. По названию метода со 100% </a:t>
-            </a:r>
-            <a:r>
-              <a:rPr lang="ru-RU" baseline="0" dirty="0" smtClean="0"/>
-              <a:t>вероятностью можно предсказать </a:t>
-            </a:r>
-            <a:r>
-              <a:rPr lang="ru-RU" baseline="0" dirty="0" smtClean="0"/>
-              <a:t>поведение метода</a:t>
+              <a:t>1. По названию метода со 100% вероятностью можно предсказать поведение метода</a:t>
             </a:r>
             <a:r>
               <a:rPr lang="ru-RU" dirty="0" smtClean="0"/>
@@ -9856,16 +9832,50 @@
               <a:buNone/>
             </a:pPr>
             <a:r>
-              <a:rPr lang="ru-RU" baseline="0" dirty="0"/>
-              <a:t>Решение с </a:t>
-            </a:r>
-            <a:r>
-              <a:rPr lang="en-US" baseline="0" dirty="0"/>
+              <a:rPr lang="ru-RU" baseline="0" dirty="0" smtClean="0"/>
+              <a:t>Решение, </a:t>
+            </a:r>
+            <a:r>
+              <a:rPr lang="ru-RU" baseline="0" dirty="0" err="1" smtClean="0"/>
+              <a:t>кторые</a:t>
+            </a:r>
+            <a:r>
+              <a:rPr lang="ru-RU" baseline="0" dirty="0" smtClean="0"/>
+              <a:t> мы обсудили очень трудно разбит </a:t>
+            </a:r>
+            <a:r>
+              <a:rPr lang="ru-RU" baseline="0" dirty="0" err="1" smtClean="0"/>
+              <a:t>ьна</a:t>
+            </a:r>
+            <a:r>
+              <a:rPr lang="ru-RU" baseline="0" dirty="0" smtClean="0"/>
+              <a:t> куски, </a:t>
+            </a:r>
+            <a:r>
+              <a:rPr lang="ru-RU" baseline="0" dirty="0" err="1" smtClean="0"/>
+              <a:t>декмопозировать</a:t>
+            </a:r>
+            <a:r>
+              <a:rPr lang="ru-RU" baseline="0" dirty="0" smtClean="0"/>
+              <a:t>.</a:t>
+            </a:r>
+            <a:br>
+              <a:rPr lang="ru-RU" baseline="0" dirty="0" smtClean="0"/>
+            </a:br>
+            <a:r>
+              <a:rPr lang="ru-RU" baseline="0" dirty="0" smtClean="0"/>
+              <a:t>Однако всё-таки можно придумать такое решение (сдвинули, приписали)</a:t>
+            </a:r>
+            <a:br>
+              <a:rPr lang="ru-RU" baseline="0" dirty="0" smtClean="0"/>
+            </a:br>
+            <a:r>
+              <a:rPr lang="ru-RU" baseline="0" dirty="0" smtClean="0"/>
+              <a:t>Особенно такое решение удачно потому, что за нас уже всё написано. Да ещё и на </a:t>
+            </a:r>
+            <a:r>
+              <a:rPr lang="en-US" baseline="0" dirty="0" smtClean="0"/>
               <a:t>LINQ</a:t>
-            </a:r>
-            <a:r>
-              <a:rPr lang="ru-RU" baseline="0" dirty="0"/>
-              <a:t> короче, очевиднее, но менее эффективно, хотя асимптотика та же.</a:t>
             </a:r>
             <a:endParaRPr lang="en-US" baseline="0" dirty="0"/>
           </a:p>
@@ -9959,15 +9969,7 @@
           <a:p>
             <a:r>
               <a:rPr lang="ru-RU" dirty="0" smtClean="0"/>
-              <a:t>Допустим, что у нас </a:t>
-            </a:r>
-            <a:r>
-              <a:rPr lang="ru-RU" dirty="0" err="1" smtClean="0"/>
-              <a:t>етсь</a:t>
-            </a:r>
-            <a:r>
-              <a:rPr lang="ru-RU" dirty="0" smtClean="0"/>
-              <a:t> требование –</a:t>
+              <a:t>Допустим, что у нас есть требование –</a:t>
             </a:r>
             <a:r>
               <a:rPr lang="ru-RU" baseline="0" dirty="0" smtClean="0"/>
@@ -10169,39 +10171,6 @@
           <a:bodyPr/>
           <a:lstStyle/>
           <a:p>
-            <a:r>
-              <a:rPr lang="ru-RU" dirty="0" smtClean="0"/>
-              <a:t>Попробовать сделать </a:t>
-            </a:r>
-            <a:r>
-              <a:rPr lang="ru-RU" dirty="0" err="1" smtClean="0"/>
-              <a:t>котопса</a:t>
-            </a:r>
-            <a:endParaRPr lang="ru-RU" dirty="0" smtClean="0"/>
-          </a:p>
-          <a:p>
-            <a:endParaRPr lang="ru-RU" dirty="0" smtClean="0"/>
-          </a:p>
-          <a:p>
-            <a:r>
-              <a:rPr lang="ru-RU" dirty="0" smtClean="0"/>
-              <a:t>Можно</a:t>
-            </a:r>
-            <a:r>
-              <a:rPr lang="ru-RU" baseline="0" dirty="0" smtClean="0"/>
-              <a:t> для понятности перевернуть </a:t>
-            </a:r>
-            <a:r>
-              <a:rPr lang="ru-RU" baseline="0" dirty="0" err="1" smtClean="0"/>
-              <a:t>котопса</a:t>
-            </a:r>
-            <a:r>
-              <a:rPr lang="ru-RU" baseline="0" dirty="0" smtClean="0"/>
-              <a:t> вверх ногами</a:t>
-            </a:r>
-            <a:endParaRPr lang="ru-RU" dirty="0" smtClean="0"/>
-          </a:p>
-          <a:p>
             <a:endParaRPr lang="ru-RU" dirty="0"/>
           </a:p>
         </p:txBody>
@@ -10782,11 +10751,7 @@
             </a:r>
             <a:r>
               <a:rPr lang="x-none" dirty="0" smtClean="0"/>
-              <a:t> Чтобы в будущем инженеру было проще использовать этот код в контексте другой задачи или проекта</a:t>
-            </a:r>
-            <a:r>
-              <a:rPr lang="x-none" dirty="0" smtClean="0"/>
-              <a:t>.</a:t>
+              <a:t> Чтобы в будущем инженеру было проще использовать этот код в контексте другой задачи или проекта.</a:t>
             </a:r>
             <a:endParaRPr lang="ru-RU" dirty="0" smtClean="0"/>
           </a:p>
@@ -10802,7 +10767,6 @@
               <a:rPr lang="ru-RU" baseline="0" dirty="0" smtClean="0"/>
               <a:t> Корректность – насколько код способен сохранять работоспособность после правок других людей. </a:t>
             </a:r>
-            <a:endParaRPr lang="ru-RU" baseline="0" dirty="0" smtClean="0"/>
           </a:p>
         </p:txBody>
       </p:sp>
@@ -11242,19 +11206,7 @@
             </a:r>
             <a:r>
               <a:rPr lang="ru-RU" baseline="0" dirty="0" smtClean="0"/>
-              <a:t> будет </a:t>
-            </a:r>
-            <a:r>
-              <a:rPr lang="ru-RU" baseline="0" dirty="0" smtClean="0"/>
-              <a:t>работать </a:t>
-            </a:r>
-            <a:r>
-              <a:rPr lang="ru-RU" baseline="0" dirty="0" smtClean="0"/>
-              <a:t>в многопоточной среде</a:t>
-            </a:r>
-            <a:r>
-              <a:rPr lang="ru-RU" baseline="0" dirty="0" smtClean="0"/>
-              <a:t>.</a:t>
+              <a:t> будет работать в многопоточной среде.</a:t>
             </a:r>
           </a:p>
         </p:txBody>
@@ -12579,6 +12531,107 @@
           <a:bodyPr/>
           <a:lstStyle/>
           <a:p>
+            <a:r>
+              <a:rPr lang="ru-RU" dirty="0" smtClean="0"/>
+              <a:t>Есть</a:t>
+            </a:r>
+            <a:r>
+              <a:rPr lang="ru-RU" baseline="0" dirty="0" smtClean="0"/>
+              <a:t> два решения</a:t>
+            </a:r>
+            <a:br>
+              <a:rPr lang="ru-RU" baseline="0" dirty="0" smtClean="0"/>
+            </a:br>
+            <a:r>
+              <a:rPr lang="ru-RU" baseline="0" dirty="0" smtClean="0"/>
+              <a:t>Отличие </a:t>
+            </a:r>
+            <a:r>
+              <a:rPr lang="en-US" baseline="0" dirty="0" smtClean="0"/>
+              <a:t>Solved </a:t>
+            </a:r>
+            <a:r>
+              <a:rPr lang="ru-RU" baseline="0" dirty="0" smtClean="0"/>
+              <a:t>от </a:t>
+            </a:r>
+            <a:r>
+              <a:rPr lang="en-US" baseline="0" dirty="0" smtClean="0"/>
+              <a:t>Solved2</a:t>
+            </a:r>
+            <a:r>
+              <a:rPr lang="ru-RU" baseline="0" dirty="0" smtClean="0"/>
+              <a:t>:</a:t>
+            </a:r>
+          </a:p>
+          <a:p>
+            <a:r>
+              <a:rPr lang="ru-RU" baseline="0" dirty="0" smtClean="0"/>
+              <a:t>В </a:t>
+            </a:r>
+            <a:r>
+              <a:rPr lang="en-US" baseline="0" dirty="0" smtClean="0"/>
+              <a:t>Solved </a:t>
+            </a:r>
+            <a:r>
+              <a:rPr lang="ru-RU" baseline="0" dirty="0" smtClean="0"/>
+              <a:t>используются только те структуры, которые уже были.</a:t>
+            </a:r>
+          </a:p>
+          <a:p>
+            <a:r>
+              <a:rPr lang="ru-RU" baseline="0" dirty="0" smtClean="0"/>
+              <a:t>В </a:t>
+            </a:r>
+            <a:r>
+              <a:rPr lang="en-US" baseline="0" dirty="0" smtClean="0"/>
+              <a:t>Solved2</a:t>
+            </a:r>
+            <a:r>
+              <a:rPr lang="ru-RU" baseline="0" dirty="0" smtClean="0"/>
+              <a:t> введена новая структура </a:t>
+            </a:r>
+            <a:r>
+              <a:rPr lang="en-US" baseline="0" dirty="0" err="1" smtClean="0"/>
+              <a:t>ChessMove</a:t>
+            </a:r>
+            <a:endParaRPr lang="en-US" baseline="0" dirty="0" smtClean="0"/>
+          </a:p>
+          <a:p>
+            <a:endParaRPr lang="en-US" baseline="0" dirty="0" smtClean="0"/>
+          </a:p>
+          <a:p>
+            <a:r>
+              <a:rPr lang="ru-RU" baseline="0" dirty="0" smtClean="0"/>
+              <a:t>В </a:t>
+            </a:r>
+            <a:r>
+              <a:rPr lang="en-US" baseline="0" dirty="0" smtClean="0"/>
+              <a:t>Solved </a:t>
+            </a:r>
+            <a:r>
+              <a:rPr lang="ru-RU" baseline="0" dirty="0" smtClean="0"/>
+              <a:t>использован другой синтаксис </a:t>
+            </a:r>
+            <a:r>
+              <a:rPr lang="en-US" baseline="0" dirty="0" smtClean="0"/>
+              <a:t>LINQ</a:t>
+            </a:r>
+            <a:r>
+              <a:rPr lang="ru-RU" baseline="0" dirty="0" smtClean="0"/>
+              <a:t>, он заменяет </a:t>
+            </a:r>
+            <a:r>
+              <a:rPr lang="en-US" baseline="0" dirty="0" err="1" smtClean="0"/>
+              <a:t>SelectMany</a:t>
+            </a:r>
+            <a:r>
+              <a:rPr lang="en-US" baseline="0" dirty="0" smtClean="0"/>
+              <a:t>. </a:t>
+            </a:r>
+            <a:r>
+              <a:rPr lang="ru-RU" baseline="0" dirty="0" smtClean="0"/>
+              <a:t>Редко, но иногда такой синтаксис всё-таки выглядит понятнее и менее громоздко.</a:t>
+            </a:r>
             <a:endParaRPr lang="ru-RU" dirty="0"/>
           </a:p>
         </p:txBody>
@@ -13357,15 +13410,7 @@
             </a:r>
             <a:r>
               <a:rPr lang="ru-RU" baseline="0" dirty="0" smtClean="0"/>
-              <a:t>В </a:t>
-            </a:r>
-            <a:r>
-              <a:rPr lang="ru-RU" baseline="0" dirty="0" smtClean="0"/>
-              <a:t>течение </a:t>
-            </a:r>
-            <a:r>
-              <a:rPr lang="ru-RU" baseline="0" dirty="0" smtClean="0"/>
-              <a:t>всего</a:t>
+              <a:t>В течение всего</a:t>
             </a:r>
             <a:r>
               <a:rPr lang="en-US" baseline="0" dirty="0" smtClean="0"/>
@@ -13377,15 +13422,7 @@
             </a:r>
             <a:r>
               <a:rPr lang="ru-RU" baseline="0" dirty="0" smtClean="0"/>
-              <a:t>-курса </a:t>
-            </a:r>
-            <a:r>
-              <a:rPr lang="ru-RU" baseline="0" dirty="0" smtClean="0"/>
-              <a:t>они должны </a:t>
-            </a:r>
-            <a:r>
-              <a:rPr lang="ru-RU" baseline="0" dirty="0" smtClean="0"/>
-              <a:t>соблюдаться.</a:t>
+              <a:t>-курса они должны соблюдаться.</a:t>
             </a:r>
             <a:endParaRPr lang="en-US" baseline="0" dirty="0" smtClean="0"/>
           </a:p>
@@ -18465,49 +18502,7 @@
               <a:rPr lang="ru-RU" sz="2200" dirty="0" smtClean="0">
                 <a:latin typeface="+mn-lt"/>
               </a:rPr>
-              <a:t>Цифры </a:t>
-            </a:r>
-            <a:r>
-              <a:rPr lang="ru-RU" sz="2200" dirty="0" smtClean="0">
-                <a:latin typeface="+mn-lt"/>
-              </a:rPr>
-              <a:t>на нечетных позициях </a:t>
-            </a:r>
-            <a:r>
-              <a:rPr lang="ru-RU" sz="2200" dirty="0" smtClean="0">
-                <a:latin typeface="+mn-lt"/>
-              </a:rPr>
-              <a:t>умножаются </a:t>
-            </a:r>
-            <a:r>
-              <a:rPr lang="ru-RU" sz="2200" dirty="0" smtClean="0">
-                <a:latin typeface="+mn-lt"/>
-              </a:rPr>
-              <a:t>на </a:t>
-            </a:r>
-            <a:r>
-              <a:rPr lang="ru-RU" sz="2200" dirty="0" smtClean="0">
-                <a:latin typeface="+mn-lt"/>
-              </a:rPr>
-              <a:t>3 </a:t>
-            </a:r>
-            <a:r>
-              <a:rPr lang="ru-RU" sz="2200" dirty="0" smtClean="0">
-                <a:latin typeface="+mn-lt"/>
-              </a:rPr>
-              <a:t>и </a:t>
-            </a:r>
-            <a:r>
-              <a:rPr lang="ru-RU" sz="2200" dirty="0" smtClean="0">
-                <a:latin typeface="+mn-lt"/>
-              </a:rPr>
-              <a:t>суммируются</a:t>
-            </a:r>
-            <a:r>
-              <a:rPr lang="ru-RU" sz="2200" dirty="0" smtClean="0">
-                <a:latin typeface="+mn-lt"/>
-              </a:rPr>
-              <a:t>, чётные прибавляются как есть.</a:t>
+              <a:t>Цифры на нечетных позициях умножаются на 3 и суммируются, чётные прибавляются как есть.</a:t>
             </a:r>
             <a:br>
               <a:rPr lang="ru-RU" sz="2200" dirty="0" smtClean="0">
@@ -18536,19 +18531,7 @@
               <a:rPr lang="ru-RU" sz="2200" dirty="0" smtClean="0">
                 <a:latin typeface="+mn-lt"/>
               </a:rPr>
-              <a:t>К </a:t>
-            </a:r>
-            <a:r>
-              <a:rPr lang="ru-RU" sz="2200" dirty="0" smtClean="0">
-                <a:latin typeface="+mn-lt"/>
-              </a:rPr>
-              <a:t>результату первого шага прибавляются цифры четных </a:t>
-            </a:r>
-            <a:r>
-              <a:rPr lang="ru-RU" sz="2200" dirty="0" smtClean="0">
-                <a:latin typeface="+mn-lt"/>
-              </a:rPr>
-              <a:t>позиций</a:t>
+              <a:t>К результату первого шага прибавляются цифры четных позиций</a:t>
             </a:r>
             <a:br>
               <a:rPr lang="ru-RU" sz="2200" dirty="0" smtClean="0">
@@ -18577,91 +18560,61 @@
               <a:rPr lang="ru-RU" sz="2200" dirty="0" smtClean="0">
                 <a:latin typeface="+mn-lt"/>
               </a:rPr>
-              <a:t>Считается </a:t>
-            </a:r>
+              <a:t>Считается остаток от деления на 10, результат назовем </a:t>
+            </a:r>
+            <a:r>
+              <a:rPr lang="en-US" sz="2200" dirty="0" smtClean="0">
+                <a:latin typeface="+mn-lt"/>
+              </a:rPr>
+              <a:t>M</a:t>
+            </a:r>
+          </a:p>
+          <a:p>
+            <a:pPr marL="742921" lvl="1" indent="-342900"/>
             <a:r>
               <a:rPr lang="ru-RU" sz="2200" dirty="0" smtClean="0">
                 <a:latin typeface="+mn-lt"/>
               </a:rPr>
-              <a:t>остаток от деления на 10, результат назовем </a:t>
+              <a:t>  	Если </a:t>
             </a:r>
             <a:r>
               <a:rPr lang="en-US" sz="2200" dirty="0" smtClean="0">
                 <a:latin typeface="+mn-lt"/>
               </a:rPr>
-              <a:t>M</a:t>
-            </a:r>
-          </a:p>
-          <a:p>
-            <a:pPr marL="742921" lvl="1" indent="-342900"/>
+              <a:t>M </a:t>
+            </a:r>
             <a:r>
               <a:rPr lang="ru-RU" sz="2200" dirty="0" smtClean="0">
                 <a:latin typeface="+mn-lt"/>
               </a:rPr>
-              <a:t>  	Если </a:t>
-            </a:r>
-            <a:r>
-              <a:rPr lang="en-US" sz="2200" dirty="0" smtClean="0">
+              <a:t>= ноль, то результат 0</a:t>
+            </a:r>
+          </a:p>
+          <a:p>
+            <a:pPr marL="742921" lvl="1" indent="-342900"/>
+            <a:r>
+              <a:rPr lang="ru-RU" sz="2200" dirty="0">
                 <a:latin typeface="+mn-lt"/>
               </a:rPr>
-              <a:t>M </a:t>
+              <a:t> </a:t>
             </a:r>
             <a:r>
               <a:rPr lang="ru-RU" sz="2200" dirty="0" smtClean="0">
                 <a:latin typeface="+mn-lt"/>
               </a:rPr>
-              <a:t>= </a:t>
+              <a:t> </a:t>
+            </a:r>
+            <a:r>
+              <a:rPr lang="ru-RU" sz="2200" dirty="0">
+                <a:latin typeface="+mn-lt"/>
+              </a:rPr>
+              <a:t>	</a:t>
             </a:r>
             <a:r>
               <a:rPr lang="ru-RU" sz="2200" dirty="0" smtClean="0">
                 <a:latin typeface="+mn-lt"/>
               </a:rPr>
-              <a:t>ноль, то </a:t>
-            </a:r>
-            <a:r>
-              <a:rPr lang="ru-RU" sz="2200" dirty="0" smtClean="0">
-                <a:latin typeface="+mn-lt"/>
-              </a:rPr>
-              <a:t>результат 0</a:t>
-            </a:r>
-          </a:p>
-          <a:p>
-            <a:pPr marL="742921" lvl="1" indent="-342900"/>
-            <a:r>
-              <a:rPr lang="ru-RU" sz="2200" dirty="0">
-                <a:latin typeface="+mn-lt"/>
-              </a:rPr>
-              <a:t> </a:t>
-            </a:r>
-            <a:r>
-              <a:rPr lang="ru-RU" sz="2200" dirty="0" smtClean="0">
-                <a:latin typeface="+mn-lt"/>
-              </a:rPr>
-              <a:t> </a:t>
-            </a:r>
-            <a:r>
-              <a:rPr lang="ru-RU" sz="2200" dirty="0">
-                <a:latin typeface="+mn-lt"/>
-              </a:rPr>
-              <a:t>	</a:t>
-            </a:r>
-            <a:r>
-              <a:rPr lang="ru-RU" sz="2200" dirty="0" smtClean="0">
-                <a:latin typeface="+mn-lt"/>
-              </a:rPr>
-              <a:t>И</a:t>
-            </a:r>
-            <a:r>
-              <a:rPr lang="ru-RU" sz="2200" dirty="0" smtClean="0">
-                <a:latin typeface="+mn-lt"/>
-              </a:rPr>
-              <a:t>наче результат 10 </a:t>
-            </a:r>
-            <a:r>
-              <a:rPr lang="ru-RU" sz="2200" dirty="0" smtClean="0">
-                <a:latin typeface="+mn-lt"/>
-              </a:rPr>
-              <a:t>- М</a:t>
+              <a:t>Иначе результат 10 - М</a:t>
             </a:r>
             <a:endParaRPr lang="en-US" sz="2200" dirty="0" smtClean="0">
               <a:latin typeface="+mn-lt"/>
@@ -19555,11 +19508,6 @@
               </a:rPr>
               <a:t>/</a:t>
             </a:r>
-            <a:endParaRPr lang="en-US" sz="2200" dirty="0">
-              <a:solidFill>
-                <a:srgbClr val="C00000"/>
-              </a:solidFill>
-            </a:endParaRPr>
           </a:p>
         </p:txBody>
       </p:sp>
@@ -20015,8 +19963,8 @@
               <a:t> </a:t>
             </a:r>
             <a:r>
-              <a:rPr lang="en-US" dirty="0"/>
-              <a:t>Principles?</a:t>
+              <a:rPr lang="en-US" dirty="0" smtClean="0"/>
+              <a:t>Principles</a:t>
             </a:r>
             <a:endParaRPr lang="ru-RU" dirty="0"/>
           </a:p>
@@ -28888,13 +28836,7 @@
               <a:rPr lang="ru-RU" sz="2200" dirty="0" smtClean="0">
                 <a:latin typeface="+mn-lt"/>
               </a:rPr>
-              <a:t>Если </a:t>
-            </a:r>
-            <a:r>
-              <a:rPr lang="ru-RU" sz="2200" dirty="0" smtClean="0">
-                <a:latin typeface="+mn-lt"/>
-              </a:rPr>
-              <a:t>= </a:t>
+              <a:t>Если = </a:t>
             </a:r>
             <a:r>
               <a:rPr lang="ru-RU" sz="2200" dirty="0">
@@ -28939,19 +28881,7 @@
               <a:rPr lang="ru-RU" sz="2200" dirty="0" smtClean="0">
                 <a:latin typeface="+mn-lt"/>
               </a:rPr>
-              <a:t>берем остаток от </a:t>
-            </a:r>
-            <a:r>
-              <a:rPr lang="ru-RU" sz="2200" dirty="0" smtClean="0">
-                <a:latin typeface="+mn-lt"/>
-              </a:rPr>
-              <a:t>деления </a:t>
-            </a:r>
-            <a:r>
-              <a:rPr lang="ru-RU" sz="2200" dirty="0" smtClean="0">
-                <a:latin typeface="+mn-lt"/>
-              </a:rPr>
-              <a:t>на 101</a:t>
+              <a:t>берем остаток от деления на 101</a:t>
             </a:r>
           </a:p>
           <a:p>
@@ -42144,6 +42074,15 @@
 
 <file path=customXml/item1.xml><?xml version="1.0" encoding="utf-8"?>
 <?mso-contentType ?>
+<FormTemplates xmlns="http://schemas.microsoft.com/sharepoint/v3/contenttype/forms">
+  <Display>DocumentLibraryForm</Display>
+  <Edit>DocumentLibraryForm</Edit>
+  <New>DocumentLibraryForm</New>
+</FormTemplates>
+</file>
+
+<file path=customXml/item2.xml><?xml version="1.0" encoding="utf-8"?>
+<?mso-contentType ?>
 <spe:Receivers xmlns:spe="http://schemas.microsoft.com/sharepoint/events">
   <Receiver>
     <Name>Document ID Generator</Name>
@@ -42186,18 +42125,6 @@
     <Filter/>
   </Receiver>
 </spe:Receivers>
-</file>
-
-<file path=customXml/item2.xml><?xml version="1.0" encoding="utf-8"?>
-<p:properties xmlns:p="http://schemas.microsoft.com/office/2006/metadata/properties" xmlns:xsi="http://www.w3.org/2001/XMLSchema-instance" xmlns:pc="http://schemas.microsoft.com/office/infopath/2007/PartnerControls">
-  <documentManagement>
-    <_dlc_DocId xmlns="0c9149cd-f996-4d9e-91c9-ce8e5945528f">KQK76PRV35WE-1143-163</_dlc_DocId>
-    <_dlc_DocIdUrl xmlns="0c9149cd-f996-4d9e-91c9-ce8e5945528f">
-      <Url>https://sps.skbkontur.ru/Services/officespace/_layouts/DocIdRedir.aspx?ID=KQK76PRV35WE-1143-163</Url>
-      <Description>KQK76PRV35WE-1143-163</Description>
-    </_dlc_DocIdUrl>
-  </documentManagement>
-</p:properties>
 </file>
 
 <file path=customXml/item3.xml><?xml version="1.0" encoding="utf-8"?>
@@ -42346,34 +42273,29 @@
 </file>
 
 <file path=customXml/item4.xml><?xml version="1.0" encoding="utf-8"?>
-<?mso-contentType ?>
-<FormTemplates xmlns="http://schemas.microsoft.com/sharepoint/v3/contenttype/forms">
-  <Display>DocumentLibraryForm</Display>
-  <Edit>DocumentLibraryForm</Edit>
-  <New>DocumentLibraryForm</New>
-</FormTemplates>
+<p:properties xmlns:p="http://schemas.microsoft.com/office/2006/metadata/properties" xmlns:xsi="http://www.w3.org/2001/XMLSchema-instance" xmlns:pc="http://schemas.microsoft.com/office/infopath/2007/PartnerControls">
+  <documentManagement>
+    <_dlc_DocId xmlns="0c9149cd-f996-4d9e-91c9-ce8e5945528f">KQK76PRV35WE-1143-163</_dlc_DocId>
+    <_dlc_DocIdUrl xmlns="0c9149cd-f996-4d9e-91c9-ce8e5945528f">
+      <Url>https://sps.skbkontur.ru/Services/officespace/_layouts/DocIdRedir.aspx?ID=KQK76PRV35WE-1143-163</Url>
+      <Description>KQK76PRV35WE-1143-163</Description>
+    </_dlc_DocIdUrl>
+  </documentManagement>
+</p:properties>
 </file>
 
 <file path=customXml/itemProps1.xml><?xml version="1.0" encoding="utf-8"?>
-<ds:datastoreItem xmlns:ds="http://schemas.openxmlformats.org/officeDocument/2006/customXml" ds:itemID="{4D57F3B4-626C-48E6-A3BF-29668BFEB3E8}">
+<ds:datastoreItem xmlns:ds="http://schemas.openxmlformats.org/officeDocument/2006/customXml" ds:itemID="{3C9FC0A9-D1C6-450E-992B-D3422A85EAB3}">
   <ds:schemaRefs>
-    <ds:schemaRef ds:uri="http://schemas.microsoft.com/sharepoint/events"/>
+    <ds:schemaRef ds:uri="http://schemas.microsoft.com/sharepoint/v3/contenttype/forms"/>
   </ds:schemaRefs>
 </ds:datastoreItem>
 </file>
 
 <file path=customXml/itemProps2.xml><?xml version="1.0" encoding="utf-8"?>
-<ds:datastoreItem xmlns:ds="http://schemas.openxmlformats.org/officeDocument/2006/customXml" ds:itemID="{45CE6859-96AE-4F55-91FD-B1143C1F920F}">
+<ds:datastoreItem xmlns:ds="http://schemas.openxmlformats.org/officeDocument/2006/customXml" ds:itemID="{4D57F3B4-626C-48E6-A3BF-29668BFEB3E8}">
   <ds:schemaRefs>
-    <ds:schemaRef ds:uri="http://schemas.microsoft.com/office/2006/documentManagement/types"/>
-    <ds:schemaRef ds:uri="http://schemas.microsoft.com/office/infopath/2007/PartnerControls"/>
-    <ds:schemaRef ds:uri="0c9149cd-f996-4d9e-91c9-ce8e5945528f"/>
-    <ds:schemaRef ds:uri="http://purl.org/dc/elements/1.1/"/>
-    <ds:schemaRef ds:uri="http://schemas.microsoft.com/office/2006/metadata/properties"/>
-    <ds:schemaRef ds:uri="http://purl.org/dc/terms/"/>
-    <ds:schemaRef ds:uri="http://schemas.openxmlformats.org/package/2006/metadata/core-properties"/>
-    <ds:schemaRef ds:uri="http://www.w3.org/XML/1998/namespace"/>
-    <ds:schemaRef ds:uri="http://purl.org/dc/dcmitype/"/>
+    <ds:schemaRef ds:uri="http://schemas.microsoft.com/sharepoint/events"/>
   </ds:schemaRefs>
 </ds:datastoreItem>
 </file>
@@ -42397,9 +42319,17 @@
 </file>
 
 <file path=customXml/itemProps4.xml><?xml version="1.0" encoding="utf-8"?>
-<ds:datastoreItem xmlns:ds="http://schemas.openxmlformats.org/officeDocument/2006/customXml" ds:itemID="{3C9FC0A9-D1C6-450E-992B-D3422A85EAB3}">
+<ds:datastoreItem xmlns:ds="http://schemas.openxmlformats.org/officeDocument/2006/customXml" ds:itemID="{45CE6859-96AE-4F55-91FD-B1143C1F920F}">
   <ds:schemaRefs>
-    <ds:schemaRef ds:uri="http://schemas.microsoft.com/sharepoint/v3/contenttype/forms"/>
+    <ds:schemaRef ds:uri="http://schemas.microsoft.com/office/2006/documentManagement/types"/>
+    <ds:schemaRef ds:uri="http://schemas.microsoft.com/office/infopath/2007/PartnerControls"/>
+    <ds:schemaRef ds:uri="0c9149cd-f996-4d9e-91c9-ce8e5945528f"/>
+    <ds:schemaRef ds:uri="http://purl.org/dc/elements/1.1/"/>
+    <ds:schemaRef ds:uri="http://schemas.microsoft.com/office/2006/metadata/properties"/>
+    <ds:schemaRef ds:uri="http://purl.org/dc/terms/"/>
+    <ds:schemaRef ds:uri="http://schemas.openxmlformats.org/package/2006/metadata/core-properties"/>
+    <ds:schemaRef ds:uri="http://www.w3.org/XML/1998/namespace"/>
+    <ds:schemaRef ds:uri="http://purl.org/dc/dcmitype/"/>
   </ds:schemaRefs>
 </ds:datastoreItem>
 </file>
</xml_diff>